<commit_message>
Week 11 - Corrected presentation
</commit_message>
<xml_diff>
--- a/Week 11/Bank Marketing Campaign Presentation.pptx
+++ b/Week 11/Bank Marketing Campaign Presentation.pptx
@@ -291,7 +291,7 @@
       </p15:sldGuideLst>
     </p:ext>
     <p:ext uri="http://customooxmlschemas.google.com/">
-      <go:slidesCustomData xmlns="" xmlns:mc="http://schemas.openxmlformats.org/markup-compatibility/2006" xmlns:mv="urn:schemas-microsoft-com:mac:vml" xmlns:c="http://schemas.openxmlformats.org/drawingml/2006/chart" xmlns:dgm="http://schemas.openxmlformats.org/drawingml/2006/diagram" xmlns:o="urn:schemas-microsoft-com:office:office" xmlns:v="urn:schemas-microsoft-com:vml" xmlns:pvml="urn:schemas-microsoft-com:office:powerpoint" xmlns:com="http://schemas.openxmlformats.org/drawingml/2006/compatibility" xmlns:p14="http://schemas.microsoft.com/office/powerpoint/2010/main" xmlns:p15="http://schemas.microsoft.com/office/powerpoint/2012/main" xmlns:ahyp="http://schemas.microsoft.com/office/drawing/2018/hyperlinkcolor" xmlns:go="http://customooxmlschemas.google.com/" r:id="rId38" roundtripDataSignature="AMtx7mj2XkNqIOC65aK6hbps7pkfdLHCYg=="/>
+      <go:slidesCustomData xmlns:go="http://customooxmlschemas.google.com/" xmlns:ahyp="http://schemas.microsoft.com/office/drawing/2018/hyperlinkcolor" xmlns:p15="http://schemas.microsoft.com/office/powerpoint/2012/main" xmlns:p14="http://schemas.microsoft.com/office/powerpoint/2010/main" xmlns:com="http://schemas.openxmlformats.org/drawingml/2006/compatibility" xmlns:pvml="urn:schemas-microsoft-com:office:powerpoint" xmlns:v="urn:schemas-microsoft-com:vml" xmlns:o="urn:schemas-microsoft-com:office:office" xmlns:dgm="http://schemas.openxmlformats.org/drawingml/2006/diagram" xmlns:c="http://schemas.openxmlformats.org/drawingml/2006/chart" xmlns:mv="urn:schemas-microsoft-com:mac:vml" xmlns:mc="http://schemas.openxmlformats.org/markup-compatibility/2006" xmlns="" r:id="rId38" roundtripDataSignature="AMtx7mj2XkNqIOC65aK6hbps7pkfdLHCYg=="/>
     </p:ext>
   </p:extLst>
 </p:presentation>
@@ -7864,10 +7864,6 @@
             <a:br>
               <a:rPr lang="en-US"/>
             </a:br>
-            <a:r>
-              <a:rPr lang="en-US"/>
-              <a:t/>
-            </a:r>
             <a:br>
               <a:rPr lang="en-US"/>
             </a:br>
@@ -19150,18 +19146,6 @@
               <a:buNone/>
             </a:pPr>
             <a:r>
-              <a:rPr lang="en-US" sz="2800" b="0" i="0" u="none" strike="noStrike" cap="none" dirty="0" smtClean="0">
-                <a:solidFill>
-                  <a:schemeClr val="lt1"/>
-                </a:solidFill>
-                <a:latin typeface="Calibri"/>
-                <a:ea typeface="Calibri"/>
-                <a:cs typeface="Calibri"/>
-                <a:sym typeface="Calibri"/>
-              </a:rPr>
-              <a:t>Akshar </a:t>
-            </a:r>
-            <a:r>
               <a:rPr lang="en-US" sz="2800" b="0" i="0" u="none" strike="noStrike" cap="none" dirty="0">
                 <a:solidFill>
                   <a:schemeClr val="lt1"/>
@@ -19171,7 +19155,7 @@
                 <a:cs typeface="Calibri"/>
                 <a:sym typeface="Calibri"/>
               </a:rPr>
-              <a:t>Chaklashiya</a:t>
+              <a:t>Akshar Chaklashiya</a:t>
             </a:r>
             <a:endParaRPr sz="2800" b="0" i="0" u="none" strike="noStrike" cap="none" dirty="0">
               <a:solidFill>
@@ -19262,7 +19246,7 @@
               <a:t>Date: </a:t>
             </a:r>
             <a:r>
-              <a:rPr lang="en-US" sz="2800" dirty="0" smtClean="0">
+              <a:rPr lang="en-US" sz="2800" dirty="0">
                 <a:solidFill>
                   <a:schemeClr val="lt1"/>
                 </a:solidFill>
@@ -19274,7 +19258,7 @@
               <a:t>15</a:t>
             </a:r>
             <a:r>
-              <a:rPr lang="en-US" sz="2800" b="0" i="0" u="none" strike="noStrike" cap="none" dirty="0" smtClean="0">
+              <a:rPr lang="en-US" sz="2800" b="0" i="0" u="none" strike="noStrike" cap="none" dirty="0">
                 <a:solidFill>
                   <a:schemeClr val="lt1"/>
                 </a:solidFill>
@@ -19298,7 +19282,7 @@
         <p:spPr>
           <a:xfrm>
             <a:off x="2400300" y="850733"/>
-            <a:ext cx="7861300" cy="1938992"/>
+            <a:ext cx="7861300" cy="1938952"/>
           </a:xfrm>
           <a:prstGeom prst="rect">
             <a:avLst/>
@@ -19324,7 +19308,7 @@
               <a:buNone/>
             </a:pPr>
             <a:r>
-              <a:rPr lang="en-US" sz="4800" b="0" i="0" u="none" strike="noStrike" cap="none">
+              <a:rPr lang="en-US" sz="4800" b="0" i="0" u="none" strike="noStrike" cap="none" dirty="0">
                 <a:solidFill>
                   <a:schemeClr val="lt1"/>
                 </a:solidFill>
@@ -19333,9 +19317,9 @@
                 <a:cs typeface="Calibri"/>
                 <a:sym typeface="Calibri"/>
               </a:rPr>
-              <a:t>Go-to-Market(G2M) Strategy</a:t>
+              <a:t>Bank Marketing Campaign</a:t>
             </a:r>
-            <a:endParaRPr/>
+            <a:endParaRPr dirty="0"/>
           </a:p>
           <a:p>
             <a:pPr marL="0" marR="0" lvl="0" indent="0" algn="ctr" rtl="0">
@@ -19347,7 +19331,7 @@
               </a:spcAft>
               <a:buNone/>
             </a:pPr>
-            <a:endParaRPr sz="3600" b="0" i="0" u="none" strike="noStrike" cap="none">
+            <a:endParaRPr sz="3600" b="0" i="0" u="none" strike="noStrike" cap="none" dirty="0">
               <a:solidFill>
                 <a:schemeClr val="lt1"/>
               </a:solidFill>
@@ -19367,7 +19351,7 @@
               </a:spcAft>
               <a:buNone/>
             </a:pPr>
-            <a:endParaRPr sz="3600" b="0" i="0" u="none" strike="noStrike" cap="none">
+            <a:endParaRPr sz="3600" b="0" i="0" u="none" strike="noStrike" cap="none" dirty="0">
               <a:solidFill>
                 <a:schemeClr val="lt1"/>
               </a:solidFill>
@@ -19456,11 +19440,7 @@
             </a:r>
             <a:r>
               <a:rPr lang="en-US" sz="4000" b="1" dirty="0"/>
-              <a:t> Overview – Categorical Variable </a:t>
-            </a:r>
-            <a:r>
-              <a:rPr lang="en-US" sz="4000" b="1" dirty="0" smtClean="0"/>
-              <a:t>Analysis</a:t>
+              <a:t> Overview – Categorical Variable Analysis</a:t>
             </a:r>
             <a:endParaRPr sz="4000" dirty="0"/>
           </a:p>
@@ -19584,13 +19564,6 @@
   <p:clrMapOvr>
     <a:masterClrMapping/>
   </p:clrMapOvr>
-  <p:timing>
-    <p:tnLst>
-      <p:par>
-        <p:cTn id="1" dur="indefinite" restart="never" nodeType="tmRoot"/>
-      </p:par>
-    </p:tnLst>
-  </p:timing>
 </p:sld>
 </file>
 
@@ -19778,13 +19751,6 @@
   <p:clrMapOvr>
     <a:masterClrMapping/>
   </p:clrMapOvr>
-  <p:timing>
-    <p:tnLst>
-      <p:par>
-        <p:cTn id="1" dur="indefinite" restart="never" nodeType="tmRoot"/>
-      </p:par>
-    </p:tnLst>
-  </p:timing>
 </p:sld>
 </file>
 
@@ -19899,13 +19865,6 @@
   <p:clrMapOvr>
     <a:masterClrMapping/>
   </p:clrMapOvr>
-  <p:timing>
-    <p:tnLst>
-      <p:par>
-        <p:cTn id="1" dur="indefinite" restart="never" nodeType="tmRoot"/>
-      </p:par>
-    </p:tnLst>
-  </p:timing>
 </p:sld>
 </file>
 
@@ -20089,13 +20048,6 @@
   <p:clrMapOvr>
     <a:masterClrMapping/>
   </p:clrMapOvr>
-  <p:timing>
-    <p:tnLst>
-      <p:par>
-        <p:cTn id="1" dur="indefinite" restart="never" nodeType="tmRoot"/>
-      </p:par>
-    </p:tnLst>
-  </p:timing>
 </p:sld>
 </file>
 
@@ -20231,13 +20183,6 @@
   <p:clrMapOvr>
     <a:masterClrMapping/>
   </p:clrMapOvr>
-  <p:timing>
-    <p:tnLst>
-      <p:par>
-        <p:cTn id="1" dur="indefinite" restart="never" nodeType="tmRoot"/>
-      </p:par>
-    </p:tnLst>
-  </p:timing>
 </p:sld>
 </file>
 
@@ -20313,7 +20258,7 @@
               <a:buNone/>
             </a:pPr>
             <a:r>
-              <a:rPr lang="en-US" b="1" dirty="0" smtClean="0"/>
+              <a:rPr lang="en-US" b="1" dirty="0"/>
               <a:t>Temporal Variable Analysis</a:t>
             </a:r>
             <a:endParaRPr dirty="0"/>
@@ -20349,13 +20294,6 @@
   <p:clrMapOvr>
     <a:masterClrMapping/>
   </p:clrMapOvr>
-  <p:timing>
-    <p:tnLst>
-      <p:par>
-        <p:cTn id="1" dur="indefinite" restart="never" nodeType="tmRoot"/>
-      </p:par>
-    </p:tnLst>
-  </p:timing>
 </p:sld>
 </file>
 
@@ -20431,7 +20369,7 @@
               <a:buNone/>
             </a:pPr>
             <a:r>
-              <a:rPr lang="en-US" b="1" dirty="0" smtClean="0"/>
+              <a:rPr lang="en-US" b="1" dirty="0"/>
               <a:t>Missing and Unknown Value</a:t>
             </a:r>
             <a:endParaRPr dirty="0"/>
@@ -20717,7 +20655,7 @@
               <a:buChar char="•"/>
             </a:pPr>
             <a:r>
-              <a:rPr lang="en-US" dirty="0" smtClean="0"/>
+              <a:rPr lang="en-US" dirty="0"/>
               <a:t>In our dataset, we don’t have any missing value</a:t>
             </a:r>
           </a:p>
@@ -20728,7 +20666,7 @@
               <a:buChar char="•"/>
             </a:pPr>
             <a:r>
-              <a:rPr lang="en-US" dirty="0" smtClean="0"/>
+              <a:rPr lang="en-US" dirty="0"/>
               <a:t>For the Unknown value, we found five feature (job, education, default, housing and loan). Row number is relatively small so we dropped those rows.</a:t>
             </a:r>
           </a:p>
@@ -20739,13 +20677,6 @@
   <p:clrMapOvr>
     <a:masterClrMapping/>
   </p:clrMapOvr>
-  <p:timing>
-    <p:tnLst>
-      <p:par>
-        <p:cTn id="1" dur="indefinite" restart="never" nodeType="tmRoot"/>
-      </p:par>
-    </p:tnLst>
-  </p:timing>
 </p:sld>
 </file>
 
@@ -20821,7 +20752,7 @@
               <a:buNone/>
             </a:pPr>
             <a:r>
-              <a:rPr lang="en-US" b="1" dirty="0" smtClean="0"/>
+              <a:rPr lang="en-US" b="1" dirty="0"/>
               <a:t>Handle outlier</a:t>
             </a:r>
             <a:endParaRPr dirty="0"/>
@@ -21114,36 +21045,8 @@
               <a:rPr lang="en-US" dirty="0"/>
             </a:br>
             <a:r>
-              <a:rPr lang="en-US" dirty="0" smtClean="0"/>
-              <a:t>Outlier </a:t>
-            </a:r>
-            <a:r>
               <a:rPr lang="en-US" dirty="0"/>
-              <a:t>points = </a:t>
-            </a:r>
-            <a:r>
-              <a:rPr lang="en-US" dirty="0" smtClean="0"/>
-              <a:t>Q3 </a:t>
-            </a:r>
-            <a:r>
-              <a:rPr lang="en-US" dirty="0"/>
-              <a:t>+ 1.5 IQR(Upper Quartile) </a:t>
-            </a:r>
-            <a:r>
-              <a:rPr lang="en-US" dirty="0" smtClean="0"/>
-              <a:t>					     Q1 </a:t>
-            </a:r>
-            <a:r>
-              <a:rPr lang="en-US" dirty="0"/>
-              <a:t>- </a:t>
-            </a:r>
-            <a:r>
-              <a:rPr lang="en-US" dirty="0" smtClean="0"/>
-              <a:t>1.5 </a:t>
-            </a:r>
-            <a:r>
-              <a:rPr lang="en-US" dirty="0"/>
-              <a:t>IQR(Lower Quartile)</a:t>
+              <a:t>Outlier points = Q3 + 1.5 IQR(Upper Quartile) 					     Q1 - 1.5 IQR(Lower Quartile)</a:t>
             </a:r>
           </a:p>
         </p:txBody>
@@ -21158,13 +21061,6 @@
   <p:clrMapOvr>
     <a:masterClrMapping/>
   </p:clrMapOvr>
-  <p:timing>
-    <p:tnLst>
-      <p:par>
-        <p:cTn id="1" dur="indefinite" restart="never" nodeType="tmRoot"/>
-      </p:par>
-    </p:tnLst>
-  </p:timing>
 </p:sld>
 </file>
 
@@ -21240,7 +21136,7 @@
               <a:buNone/>
             </a:pPr>
             <a:r>
-              <a:rPr lang="en-US" b="1" dirty="0" smtClean="0"/>
+              <a:rPr lang="en-US" b="1" dirty="0"/>
               <a:t>Box plot graph - I</a:t>
             </a:r>
             <a:endParaRPr dirty="0"/>
@@ -21281,13 +21177,6 @@
   <p:clrMapOvr>
     <a:masterClrMapping/>
   </p:clrMapOvr>
-  <p:timing>
-    <p:tnLst>
-      <p:par>
-        <p:cTn id="1" dur="indefinite" restart="never" nodeType="tmRoot"/>
-      </p:par>
-    </p:tnLst>
-  </p:timing>
 </p:sld>
 </file>
 
@@ -21363,7 +21252,7 @@
               <a:buNone/>
             </a:pPr>
             <a:r>
-              <a:rPr lang="en-US" b="1" dirty="0" smtClean="0"/>
+              <a:rPr lang="en-US" b="1" dirty="0"/>
               <a:t>Box plot graph - II</a:t>
             </a:r>
             <a:endParaRPr dirty="0"/>
@@ -21404,13 +21293,6 @@
   <p:clrMapOvr>
     <a:masterClrMapping/>
   </p:clrMapOvr>
-  <p:timing>
-    <p:tnLst>
-      <p:par>
-        <p:cTn id="1" dur="indefinite" restart="never" nodeType="tmRoot"/>
-      </p:par>
-    </p:tnLst>
-  </p:timing>
 </p:sld>
 </file>
 
@@ -21748,7 +21630,7 @@
               <a:buNone/>
             </a:pPr>
             <a:r>
-              <a:rPr lang="en-US" b="1" dirty="0" smtClean="0"/>
+              <a:rPr lang="en-US" b="1" dirty="0"/>
               <a:t>Categorical variable analysis - I</a:t>
             </a:r>
             <a:endParaRPr dirty="0"/>
@@ -21813,13 +21695,6 @@
   <p:clrMapOvr>
     <a:masterClrMapping/>
   </p:clrMapOvr>
-  <p:timing>
-    <p:tnLst>
-      <p:par>
-        <p:cTn id="1" dur="indefinite" restart="never" nodeType="tmRoot"/>
-      </p:par>
-    </p:tnLst>
-  </p:timing>
 </p:sld>
 </file>
 
@@ -21874,11 +21749,7 @@
             </a:pPr>
             <a:r>
               <a:rPr lang="en-US" b="1" dirty="0"/>
-              <a:t>Categorical variable </a:t>
-            </a:r>
-            <a:r>
-              <a:rPr lang="en-US" b="1" dirty="0" smtClean="0"/>
-              <a:t>analysis - II</a:t>
+              <a:t>Categorical variable analysis - II</a:t>
             </a:r>
             <a:endParaRPr dirty="0"/>
           </a:p>
@@ -21942,13 +21813,6 @@
   <p:clrMapOvr>
     <a:masterClrMapping/>
   </p:clrMapOvr>
-  <p:timing>
-    <p:tnLst>
-      <p:par>
-        <p:cTn id="1" dur="indefinite" restart="never" nodeType="tmRoot"/>
-      </p:par>
-    </p:tnLst>
-  </p:timing>
 </p:sld>
 </file>
 
@@ -22003,11 +21867,7 @@
             </a:pPr>
             <a:r>
               <a:rPr lang="en-US" b="1" dirty="0"/>
-              <a:t>Categorical variable analysis - </a:t>
-            </a:r>
-            <a:r>
-              <a:rPr lang="en-US" b="1" dirty="0" smtClean="0"/>
-              <a:t>III</a:t>
+              <a:t>Categorical variable analysis - III</a:t>
             </a:r>
             <a:endParaRPr dirty="0"/>
           </a:p>
@@ -22071,13 +21931,6 @@
   <p:clrMapOvr>
     <a:masterClrMapping/>
   </p:clrMapOvr>
-  <p:timing>
-    <p:tnLst>
-      <p:par>
-        <p:cTn id="1" dur="indefinite" restart="never" nodeType="tmRoot"/>
-      </p:par>
-    </p:tnLst>
-  </p:timing>
 </p:sld>
 </file>
 
@@ -22192,13 +22045,6 @@
   <p:clrMapOvr>
     <a:masterClrMapping/>
   </p:clrMapOvr>
-  <p:timing>
-    <p:tnLst>
-      <p:par>
-        <p:cTn id="1" dur="indefinite" restart="never" nodeType="tmRoot"/>
-      </p:par>
-    </p:tnLst>
-  </p:timing>
 </p:sld>
 </file>
 
@@ -22325,13 +22171,6 @@
   <p:clrMapOvr>
     <a:masterClrMapping/>
   </p:clrMapOvr>
-  <p:timing>
-    <p:tnLst>
-      <p:par>
-        <p:cTn id="1" dur="indefinite" restart="never" nodeType="tmRoot"/>
-      </p:par>
-    </p:tnLst>
-  </p:timing>
 </p:sld>
 </file>
 
@@ -22443,13 +22282,6 @@
   <p:clrMapOvr>
     <a:masterClrMapping/>
   </p:clrMapOvr>
-  <p:timing>
-    <p:tnLst>
-      <p:par>
-        <p:cTn id="1" dur="indefinite" restart="never" nodeType="tmRoot"/>
-      </p:par>
-    </p:tnLst>
-  </p:timing>
 </p:sld>
 </file>
 
@@ -22525,7 +22357,7 @@
               <a:buNone/>
             </a:pPr>
             <a:r>
-              <a:rPr lang="en-US" b="1" dirty="0" smtClean="0"/>
+              <a:rPr lang="en-US" b="1" dirty="0"/>
               <a:t>Age vs Job Analysis</a:t>
             </a:r>
             <a:endParaRPr dirty="0"/>
@@ -22566,13 +22398,6 @@
   <p:clrMapOvr>
     <a:masterClrMapping/>
   </p:clrMapOvr>
-  <p:timing>
-    <p:tnLst>
-      <p:par>
-        <p:cTn id="1" dur="indefinite" restart="never" nodeType="tmRoot"/>
-      </p:par>
-    </p:tnLst>
-  </p:timing>
 </p:sld>
 </file>
 
@@ -22688,13 +22513,6 @@
   <p:clrMapOvr>
     <a:masterClrMapping/>
   </p:clrMapOvr>
-  <p:timing>
-    <p:tnLst>
-      <p:par>
-        <p:cTn id="1" dur="indefinite" restart="never" nodeType="tmRoot"/>
-      </p:par>
-    </p:tnLst>
-  </p:timing>
 </p:sld>
 </file>
 
@@ -28276,13 +28094,6 @@
   <p:clrMapOvr>
     <a:masterClrMapping/>
   </p:clrMapOvr>
-  <p:timing>
-    <p:tnLst>
-      <p:par>
-        <p:cTn id="1" dur="indefinite" restart="never" nodeType="tmRoot"/>
-      </p:par>
-    </p:tnLst>
-  </p:timing>
 </p:sld>
 </file>
 
@@ -28600,13 +28411,6 @@
   <p:clrMapOvr>
     <a:masterClrMapping/>
   </p:clrMapOvr>
-  <p:timing>
-    <p:tnLst>
-      <p:par>
-        <p:cTn id="1" dur="indefinite" restart="never" nodeType="tmRoot"/>
-      </p:par>
-    </p:tnLst>
-  </p:timing>
 </p:sld>
 </file>
 
@@ -28873,13 +28677,6 @@
   <p:clrMapOvr>
     <a:masterClrMapping/>
   </p:clrMapOvr>
-  <p:timing>
-    <p:tnLst>
-      <p:par>
-        <p:cTn id="1" dur="indefinite" restart="never" nodeType="tmRoot"/>
-      </p:par>
-    </p:tnLst>
-  </p:timing>
 </p:sld>
 </file>
 
@@ -28947,11 +28744,11 @@
               <a:buNone/>
             </a:pPr>
             <a:r>
-              <a:rPr lang="en-US" sz="4800" b="1" dirty="0" smtClean="0"/>
+              <a:rPr lang="en-US" sz="4800" b="1" dirty="0"/>
               <a:t>Target variable </a:t>
             </a:r>
             <a:r>
-              <a:rPr lang="en-US" sz="4000" b="1" dirty="0" smtClean="0"/>
+              <a:rPr lang="en-US" sz="4000" b="1" dirty="0"/>
               <a:t>Analysis</a:t>
             </a:r>
             <a:endParaRPr sz="4000" dirty="0"/>
@@ -29261,14 +29058,9 @@
               <a:buChar char="•"/>
             </a:pPr>
             <a:r>
-              <a:rPr lang="en-US" sz="4000" dirty="0" smtClean="0"/>
-              <a:t>An </a:t>
+              <a:rPr lang="en-US" sz="4000" dirty="0"/>
+              <a:t>An imbalance in the target variable. </a:t>
             </a:r>
-            <a:r>
-              <a:rPr lang="en-US" sz="4000" dirty="0"/>
-              <a:t>imbalance in the target variable. </a:t>
-            </a:r>
-            <a:endParaRPr lang="en-US" sz="4000" dirty="0" smtClean="0"/>
           </a:p>
           <a:p>
             <a:pPr marL="571500" indent="-571500">
@@ -29277,12 +29069,8 @@
               <a:buChar char="•"/>
             </a:pPr>
             <a:r>
-              <a:rPr lang="en-US" sz="4000" dirty="0" smtClean="0"/>
-              <a:t>An </a:t>
-            </a:r>
-            <a:r>
               <a:rPr lang="en-US" sz="4000" dirty="0"/>
-              <a:t>oversampling technique must be applied before model building</a:t>
+              <a:t>An oversampling technique must be applied before model building</a:t>
             </a:r>
           </a:p>
         </p:txBody>
@@ -29292,13 +29080,6 @@
   <p:clrMapOvr>
     <a:masterClrMapping/>
   </p:clrMapOvr>
-  <p:timing>
-    <p:tnLst>
-      <p:par>
-        <p:cTn id="1" dur="indefinite" restart="never" nodeType="tmRoot"/>
-      </p:par>
-    </p:tnLst>
-  </p:timing>
 </p:sld>
 </file>
 

</xml_diff>